<commit_message>
Use virtual and a virtual destructor
</commit_message>
<xml_diff>
--- a/6019_Phys_1/D2D/W02/Collision_Detection.pptx
+++ b/6019_Phys_1/D2D/W02/Collision_Detection.pptx
@@ -9,6 +9,8 @@
     <p:sldId id="257" r:id="rId3"/>
     <p:sldId id="258" r:id="rId4"/>
     <p:sldId id="259" r:id="rId5"/>
+    <p:sldId id="260" r:id="rId6"/>
+    <p:sldId id="261" r:id="rId7"/>
   </p:sldIdLst>
   <p:sldSz cx="12192000" cy="6858000"/>
   <p:notesSz cx="6858000" cy="9144000"/>
@@ -264,7 +266,7 @@
           <a:p>
             <a:fld id="{17096AE8-8B40-4419-992A-057BFACC0AD3}" type="datetimeFigureOut">
               <a:rPr lang="en-CA" smtClean="0"/>
-              <a:t>2023-09-21</a:t>
+              <a:t>2023-09-28</a:t>
             </a:fld>
             <a:endParaRPr lang="en-CA"/>
           </a:p>
@@ -464,7 +466,7 @@
           <a:p>
             <a:fld id="{17096AE8-8B40-4419-992A-057BFACC0AD3}" type="datetimeFigureOut">
               <a:rPr lang="en-CA" smtClean="0"/>
-              <a:t>2023-09-21</a:t>
+              <a:t>2023-09-28</a:t>
             </a:fld>
             <a:endParaRPr lang="en-CA"/>
           </a:p>
@@ -674,7 +676,7 @@
           <a:p>
             <a:fld id="{17096AE8-8B40-4419-992A-057BFACC0AD3}" type="datetimeFigureOut">
               <a:rPr lang="en-CA" smtClean="0"/>
-              <a:t>2023-09-21</a:t>
+              <a:t>2023-09-28</a:t>
             </a:fld>
             <a:endParaRPr lang="en-CA"/>
           </a:p>
@@ -874,7 +876,7 @@
           <a:p>
             <a:fld id="{17096AE8-8B40-4419-992A-057BFACC0AD3}" type="datetimeFigureOut">
               <a:rPr lang="en-CA" smtClean="0"/>
-              <a:t>2023-09-21</a:t>
+              <a:t>2023-09-28</a:t>
             </a:fld>
             <a:endParaRPr lang="en-CA"/>
           </a:p>
@@ -1150,7 +1152,7 @@
           <a:p>
             <a:fld id="{17096AE8-8B40-4419-992A-057BFACC0AD3}" type="datetimeFigureOut">
               <a:rPr lang="en-CA" smtClean="0"/>
-              <a:t>2023-09-21</a:t>
+              <a:t>2023-09-28</a:t>
             </a:fld>
             <a:endParaRPr lang="en-CA"/>
           </a:p>
@@ -1418,7 +1420,7 @@
           <a:p>
             <a:fld id="{17096AE8-8B40-4419-992A-057BFACC0AD3}" type="datetimeFigureOut">
               <a:rPr lang="en-CA" smtClean="0"/>
-              <a:t>2023-09-21</a:t>
+              <a:t>2023-09-28</a:t>
             </a:fld>
             <a:endParaRPr lang="en-CA"/>
           </a:p>
@@ -1833,7 +1835,7 @@
           <a:p>
             <a:fld id="{17096AE8-8B40-4419-992A-057BFACC0AD3}" type="datetimeFigureOut">
               <a:rPr lang="en-CA" smtClean="0"/>
-              <a:t>2023-09-21</a:t>
+              <a:t>2023-09-28</a:t>
             </a:fld>
             <a:endParaRPr lang="en-CA"/>
           </a:p>
@@ -1975,7 +1977,7 @@
           <a:p>
             <a:fld id="{17096AE8-8B40-4419-992A-057BFACC0AD3}" type="datetimeFigureOut">
               <a:rPr lang="en-CA" smtClean="0"/>
-              <a:t>2023-09-21</a:t>
+              <a:t>2023-09-28</a:t>
             </a:fld>
             <a:endParaRPr lang="en-CA"/>
           </a:p>
@@ -2088,7 +2090,7 @@
           <a:p>
             <a:fld id="{17096AE8-8B40-4419-992A-057BFACC0AD3}" type="datetimeFigureOut">
               <a:rPr lang="en-CA" smtClean="0"/>
-              <a:t>2023-09-21</a:t>
+              <a:t>2023-09-28</a:t>
             </a:fld>
             <a:endParaRPr lang="en-CA"/>
           </a:p>
@@ -2401,7 +2403,7 @@
           <a:p>
             <a:fld id="{17096AE8-8B40-4419-992A-057BFACC0AD3}" type="datetimeFigureOut">
               <a:rPr lang="en-CA" smtClean="0"/>
-              <a:t>2023-09-21</a:t>
+              <a:t>2023-09-28</a:t>
             </a:fld>
             <a:endParaRPr lang="en-CA"/>
           </a:p>
@@ -2690,7 +2692,7 @@
           <a:p>
             <a:fld id="{17096AE8-8B40-4419-992A-057BFACC0AD3}" type="datetimeFigureOut">
               <a:rPr lang="en-CA" smtClean="0"/>
-              <a:t>2023-09-21</a:t>
+              <a:t>2023-09-28</a:t>
             </a:fld>
             <a:endParaRPr lang="en-CA"/>
           </a:p>
@@ -2933,7 +2935,7 @@
           <a:p>
             <a:fld id="{17096AE8-8B40-4419-992A-057BFACC0AD3}" type="datetimeFigureOut">
               <a:rPr lang="en-CA" smtClean="0"/>
-              <a:t>2023-09-21</a:t>
+              <a:t>2023-09-28</a:t>
             </a:fld>
             <a:endParaRPr lang="en-CA"/>
           </a:p>
@@ -5722,6 +5724,976 @@
 </p:sld>
 </file>
 
+<file path=ppt/slides/slide5.xml><?xml version="1.0" encoding="utf-8"?>
+<p:sld xmlns:a="http://schemas.openxmlformats.org/drawingml/2006/main" xmlns:r="http://schemas.openxmlformats.org/officeDocument/2006/relationships" xmlns:p="http://schemas.openxmlformats.org/presentationml/2006/main">
+  <p:cSld>
+    <p:spTree>
+      <p:nvGrpSpPr>
+        <p:cNvPr id="1" name=""/>
+        <p:cNvGrpSpPr/>
+        <p:nvPr/>
+      </p:nvGrpSpPr>
+      <p:grpSpPr>
+        <a:xfrm>
+          <a:off x="0" y="0"/>
+          <a:ext cx="0" cy="0"/>
+          <a:chOff x="0" y="0"/>
+          <a:chExt cx="0" cy="0"/>
+        </a:xfrm>
+      </p:grpSpPr>
+      <p:grpSp>
+        <p:nvGrpSpPr>
+          <p:cNvPr id="12" name="Group 11">
+            <a:extLst>
+              <a:ext uri="{FF2B5EF4-FFF2-40B4-BE49-F238E27FC236}">
+                <a16:creationId xmlns:a16="http://schemas.microsoft.com/office/drawing/2014/main" id="{475C41AE-9704-3B51-0D67-55D3F1BA8FB3}"/>
+              </a:ext>
+            </a:extLst>
+          </p:cNvPr>
+          <p:cNvGrpSpPr/>
+          <p:nvPr/>
+        </p:nvGrpSpPr>
+        <p:grpSpPr>
+          <a:xfrm>
+            <a:off x="4121552" y="1876821"/>
+            <a:ext cx="1866122" cy="1866122"/>
+            <a:chOff x="5411755" y="270588"/>
+            <a:chExt cx="1866122" cy="1866122"/>
+          </a:xfrm>
+        </p:grpSpPr>
+        <p:sp>
+          <p:nvSpPr>
+            <p:cNvPr id="2" name="Oval 1">
+              <a:extLst>
+                <a:ext uri="{FF2B5EF4-FFF2-40B4-BE49-F238E27FC236}">
+                  <a16:creationId xmlns:a16="http://schemas.microsoft.com/office/drawing/2014/main" id="{DE784E79-97CD-5541-FE30-0EFAFDBF7A96}"/>
+                </a:ext>
+              </a:extLst>
+            </p:cNvPr>
+            <p:cNvSpPr/>
+            <p:nvPr/>
+          </p:nvSpPr>
+          <p:spPr>
+            <a:xfrm>
+              <a:off x="5411755" y="270588"/>
+              <a:ext cx="1866122" cy="1866122"/>
+            </a:xfrm>
+            <a:prstGeom prst="ellipse">
+              <a:avLst/>
+            </a:prstGeom>
+          </p:spPr>
+          <p:style>
+            <a:lnRef idx="2">
+              <a:schemeClr val="accent1">
+                <a:shade val="15000"/>
+              </a:schemeClr>
+            </a:lnRef>
+            <a:fillRef idx="1">
+              <a:schemeClr val="accent1"/>
+            </a:fillRef>
+            <a:effectRef idx="0">
+              <a:schemeClr val="accent1"/>
+            </a:effectRef>
+            <a:fontRef idx="minor">
+              <a:schemeClr val="lt1"/>
+            </a:fontRef>
+          </p:style>
+          <p:txBody>
+            <a:bodyPr rtlCol="0" anchor="ctr"/>
+            <a:lstStyle/>
+            <a:p>
+              <a:pPr algn="ctr"/>
+              <a:endParaRPr lang="en-CA"/>
+            </a:p>
+          </p:txBody>
+        </p:sp>
+        <p:sp>
+          <p:nvSpPr>
+            <p:cNvPr id="4" name="Oval 3">
+              <a:extLst>
+                <a:ext uri="{FF2B5EF4-FFF2-40B4-BE49-F238E27FC236}">
+                  <a16:creationId xmlns:a16="http://schemas.microsoft.com/office/drawing/2014/main" id="{31978DBD-65A7-1943-216C-5EE14F1429CB}"/>
+                </a:ext>
+              </a:extLst>
+            </p:cNvPr>
+            <p:cNvSpPr/>
+            <p:nvPr/>
+          </p:nvSpPr>
+          <p:spPr>
+            <a:xfrm>
+              <a:off x="6218853" y="1077686"/>
+              <a:ext cx="251926" cy="251926"/>
+            </a:xfrm>
+            <a:prstGeom prst="ellipse">
+              <a:avLst/>
+            </a:prstGeom>
+          </p:spPr>
+          <p:style>
+            <a:lnRef idx="2">
+              <a:schemeClr val="accent6">
+                <a:shade val="15000"/>
+              </a:schemeClr>
+            </a:lnRef>
+            <a:fillRef idx="1">
+              <a:schemeClr val="accent6"/>
+            </a:fillRef>
+            <a:effectRef idx="0">
+              <a:schemeClr val="accent6"/>
+            </a:effectRef>
+            <a:fontRef idx="minor">
+              <a:schemeClr val="lt1"/>
+            </a:fontRef>
+          </p:style>
+          <p:txBody>
+            <a:bodyPr rtlCol="0" anchor="ctr"/>
+            <a:lstStyle/>
+            <a:p>
+              <a:pPr algn="ctr"/>
+              <a:endParaRPr lang="en-CA"/>
+            </a:p>
+          </p:txBody>
+        </p:sp>
+      </p:grpSp>
+      <p:grpSp>
+        <p:nvGrpSpPr>
+          <p:cNvPr id="5" name="Group 4">
+            <a:extLst>
+              <a:ext uri="{FF2B5EF4-FFF2-40B4-BE49-F238E27FC236}">
+                <a16:creationId xmlns:a16="http://schemas.microsoft.com/office/drawing/2014/main" id="{9BD2E04C-3DF3-5020-BEC8-C72743603AF3}"/>
+              </a:ext>
+            </a:extLst>
+          </p:cNvPr>
+          <p:cNvGrpSpPr/>
+          <p:nvPr/>
+        </p:nvGrpSpPr>
+        <p:grpSpPr>
+          <a:xfrm>
+            <a:off x="4290260" y="2467157"/>
+            <a:ext cx="4114289" cy="3424181"/>
+            <a:chOff x="5282041" y="-1287471"/>
+            <a:chExt cx="4114289" cy="3424181"/>
+          </a:xfrm>
+        </p:grpSpPr>
+        <p:sp>
+          <p:nvSpPr>
+            <p:cNvPr id="6" name="Oval 5">
+              <a:extLst>
+                <a:ext uri="{FF2B5EF4-FFF2-40B4-BE49-F238E27FC236}">
+                  <a16:creationId xmlns:a16="http://schemas.microsoft.com/office/drawing/2014/main" id="{5732D2B3-BBD4-104C-6B94-9C93DC90C381}"/>
+                </a:ext>
+              </a:extLst>
+            </p:cNvPr>
+            <p:cNvSpPr/>
+            <p:nvPr/>
+          </p:nvSpPr>
+          <p:spPr>
+            <a:xfrm>
+              <a:off x="5411755" y="270588"/>
+              <a:ext cx="1866122" cy="1866122"/>
+            </a:xfrm>
+            <a:prstGeom prst="ellipse">
+              <a:avLst/>
+            </a:prstGeom>
+          </p:spPr>
+          <p:style>
+            <a:lnRef idx="2">
+              <a:schemeClr val="accent1">
+                <a:shade val="15000"/>
+              </a:schemeClr>
+            </a:lnRef>
+            <a:fillRef idx="1">
+              <a:schemeClr val="accent1"/>
+            </a:fillRef>
+            <a:effectRef idx="0">
+              <a:schemeClr val="accent1"/>
+            </a:effectRef>
+            <a:fontRef idx="minor">
+              <a:schemeClr val="lt1"/>
+            </a:fontRef>
+          </p:style>
+          <p:txBody>
+            <a:bodyPr rtlCol="0" anchor="ctr"/>
+            <a:lstStyle/>
+            <a:p>
+              <a:pPr algn="ctr"/>
+              <a:endParaRPr lang="en-CA"/>
+            </a:p>
+          </p:txBody>
+        </p:sp>
+        <p:sp>
+          <p:nvSpPr>
+            <p:cNvPr id="7" name="Oval 6">
+              <a:extLst>
+                <a:ext uri="{FF2B5EF4-FFF2-40B4-BE49-F238E27FC236}">
+                  <a16:creationId xmlns:a16="http://schemas.microsoft.com/office/drawing/2014/main" id="{0F5853FC-B2D8-41F0-0F30-53B94311DB0E}"/>
+                </a:ext>
+              </a:extLst>
+            </p:cNvPr>
+            <p:cNvSpPr/>
+            <p:nvPr/>
+          </p:nvSpPr>
+          <p:spPr>
+            <a:xfrm>
+              <a:off x="6218853" y="1077686"/>
+              <a:ext cx="251926" cy="251926"/>
+            </a:xfrm>
+            <a:prstGeom prst="ellipse">
+              <a:avLst/>
+            </a:prstGeom>
+          </p:spPr>
+          <p:style>
+            <a:lnRef idx="2">
+              <a:schemeClr val="accent6">
+                <a:shade val="15000"/>
+              </a:schemeClr>
+            </a:lnRef>
+            <a:fillRef idx="1">
+              <a:schemeClr val="accent6"/>
+            </a:fillRef>
+            <a:effectRef idx="0">
+              <a:schemeClr val="accent6"/>
+            </a:effectRef>
+            <a:fontRef idx="minor">
+              <a:schemeClr val="lt1"/>
+            </a:fontRef>
+          </p:style>
+          <p:txBody>
+            <a:bodyPr rtlCol="0" anchor="ctr"/>
+            <a:lstStyle/>
+            <a:p>
+              <a:pPr algn="ctr"/>
+              <a:endParaRPr lang="en-CA"/>
+            </a:p>
+          </p:txBody>
+        </p:sp>
+        <p:sp>
+          <p:nvSpPr>
+            <p:cNvPr id="13" name="Oval 12">
+              <a:extLst>
+                <a:ext uri="{FF2B5EF4-FFF2-40B4-BE49-F238E27FC236}">
+                  <a16:creationId xmlns:a16="http://schemas.microsoft.com/office/drawing/2014/main" id="{2C36E9A6-41BB-6B02-198A-4EFC46AE4F95}"/>
+                </a:ext>
+              </a:extLst>
+            </p:cNvPr>
+            <p:cNvSpPr/>
+            <p:nvPr/>
+          </p:nvSpPr>
+          <p:spPr>
+            <a:xfrm>
+              <a:off x="7530208" y="-817416"/>
+              <a:ext cx="1866122" cy="1866122"/>
+            </a:xfrm>
+            <a:prstGeom prst="ellipse">
+              <a:avLst/>
+            </a:prstGeom>
+          </p:spPr>
+          <p:style>
+            <a:lnRef idx="2">
+              <a:schemeClr val="accent1">
+                <a:shade val="15000"/>
+              </a:schemeClr>
+            </a:lnRef>
+            <a:fillRef idx="1">
+              <a:schemeClr val="accent1"/>
+            </a:fillRef>
+            <a:effectRef idx="0">
+              <a:schemeClr val="accent1"/>
+            </a:effectRef>
+            <a:fontRef idx="minor">
+              <a:schemeClr val="lt1"/>
+            </a:fontRef>
+          </p:style>
+          <p:txBody>
+            <a:bodyPr rtlCol="0" anchor="ctr"/>
+            <a:lstStyle/>
+            <a:p>
+              <a:pPr algn="ctr"/>
+              <a:endParaRPr lang="en-CA"/>
+            </a:p>
+          </p:txBody>
+        </p:sp>
+        <p:sp>
+          <p:nvSpPr>
+            <p:cNvPr id="18" name="Oval 17">
+              <a:extLst>
+                <a:ext uri="{FF2B5EF4-FFF2-40B4-BE49-F238E27FC236}">
+                  <a16:creationId xmlns:a16="http://schemas.microsoft.com/office/drawing/2014/main" id="{5C5A5539-D27D-C442-D0C4-7B8AF856A279}"/>
+                </a:ext>
+              </a:extLst>
+            </p:cNvPr>
+            <p:cNvSpPr/>
+            <p:nvPr/>
+          </p:nvSpPr>
+          <p:spPr>
+            <a:xfrm>
+              <a:off x="5282041" y="-1287471"/>
+              <a:ext cx="1866122" cy="1866122"/>
+            </a:xfrm>
+            <a:prstGeom prst="ellipse">
+              <a:avLst/>
+            </a:prstGeom>
+          </p:spPr>
+          <p:style>
+            <a:lnRef idx="3">
+              <a:schemeClr val="lt1"/>
+            </a:lnRef>
+            <a:fillRef idx="1">
+              <a:schemeClr val="accent6"/>
+            </a:fillRef>
+            <a:effectRef idx="1">
+              <a:schemeClr val="accent6"/>
+            </a:effectRef>
+            <a:fontRef idx="minor">
+              <a:schemeClr val="lt1"/>
+            </a:fontRef>
+          </p:style>
+          <p:txBody>
+            <a:bodyPr rtlCol="0" anchor="ctr"/>
+            <a:lstStyle/>
+            <a:p>
+              <a:pPr algn="ctr"/>
+              <a:endParaRPr lang="en-CA"/>
+            </a:p>
+          </p:txBody>
+        </p:sp>
+      </p:grpSp>
+      <p:grpSp>
+        <p:nvGrpSpPr>
+          <p:cNvPr id="19" name="Group 18">
+            <a:extLst>
+              <a:ext uri="{FF2B5EF4-FFF2-40B4-BE49-F238E27FC236}">
+                <a16:creationId xmlns:a16="http://schemas.microsoft.com/office/drawing/2014/main" id="{44BC38BE-558F-F45B-E1FA-CB7F5099D18A}"/>
+              </a:ext>
+            </a:extLst>
+          </p:cNvPr>
+          <p:cNvGrpSpPr/>
+          <p:nvPr/>
+        </p:nvGrpSpPr>
+        <p:grpSpPr>
+          <a:xfrm rot="488119">
+            <a:off x="777270" y="1888739"/>
+            <a:ext cx="10664890" cy="2836505"/>
+            <a:chOff x="849086" y="1884784"/>
+            <a:chExt cx="10664890" cy="2836505"/>
+          </a:xfrm>
+        </p:grpSpPr>
+        <p:grpSp>
+          <p:nvGrpSpPr>
+            <p:cNvPr id="11" name="Group 10">
+              <a:extLst>
+                <a:ext uri="{FF2B5EF4-FFF2-40B4-BE49-F238E27FC236}">
+                  <a16:creationId xmlns:a16="http://schemas.microsoft.com/office/drawing/2014/main" id="{23861D54-A63D-3461-0916-434ECCFC1DE5}"/>
+                </a:ext>
+              </a:extLst>
+            </p:cNvPr>
+            <p:cNvGrpSpPr/>
+            <p:nvPr/>
+          </p:nvGrpSpPr>
+          <p:grpSpPr>
+            <a:xfrm>
+              <a:off x="849086" y="2435290"/>
+              <a:ext cx="10664890" cy="2285999"/>
+              <a:chOff x="849086" y="2435290"/>
+              <a:chExt cx="10664890" cy="2285999"/>
+            </a:xfrm>
+          </p:grpSpPr>
+          <p:sp>
+            <p:nvSpPr>
+              <p:cNvPr id="3" name="Rectangle 2">
+                <a:extLst>
+                  <a:ext uri="{FF2B5EF4-FFF2-40B4-BE49-F238E27FC236}">
+                    <a16:creationId xmlns:a16="http://schemas.microsoft.com/office/drawing/2014/main" id="{5F9CDCFC-CD9A-334D-90BD-CBCA001B7BB5}"/>
+                  </a:ext>
+                </a:extLst>
+              </p:cNvPr>
+              <p:cNvSpPr/>
+              <p:nvPr/>
+            </p:nvSpPr>
+            <p:spPr>
+              <a:xfrm>
+                <a:off x="849086" y="4469363"/>
+                <a:ext cx="10664890" cy="251926"/>
+              </a:xfrm>
+              <a:prstGeom prst="rect">
+                <a:avLst/>
+              </a:prstGeom>
+            </p:spPr>
+            <p:style>
+              <a:lnRef idx="2">
+                <a:schemeClr val="accent1">
+                  <a:shade val="15000"/>
+                </a:schemeClr>
+              </a:lnRef>
+              <a:fillRef idx="1">
+                <a:schemeClr val="accent1"/>
+              </a:fillRef>
+              <a:effectRef idx="0">
+                <a:schemeClr val="accent1"/>
+              </a:effectRef>
+              <a:fontRef idx="minor">
+                <a:schemeClr val="lt1"/>
+              </a:fontRef>
+            </p:style>
+            <p:txBody>
+              <a:bodyPr rtlCol="0" anchor="ctr"/>
+              <a:lstStyle/>
+              <a:p>
+                <a:pPr algn="ctr"/>
+                <a:endParaRPr lang="en-CA"/>
+              </a:p>
+            </p:txBody>
+          </p:sp>
+          <p:cxnSp>
+            <p:nvCxnSpPr>
+              <p:cNvPr id="9" name="Straight Arrow Connector 8">
+                <a:extLst>
+                  <a:ext uri="{FF2B5EF4-FFF2-40B4-BE49-F238E27FC236}">
+                    <a16:creationId xmlns:a16="http://schemas.microsoft.com/office/drawing/2014/main" id="{C3C3D3EC-9092-0D5B-3183-63E88C5D84D2}"/>
+                  </a:ext>
+                </a:extLst>
+              </p:cNvPr>
+              <p:cNvCxnSpPr>
+                <a:cxnSpLocks/>
+                <a:stCxn id="3" idx="0"/>
+              </p:cNvCxnSpPr>
+              <p:nvPr/>
+            </p:nvCxnSpPr>
+            <p:spPr>
+              <a:xfrm flipV="1">
+                <a:off x="6181531" y="2435290"/>
+                <a:ext cx="0" cy="2034073"/>
+              </a:xfrm>
+              <a:prstGeom prst="straightConnector1">
+                <a:avLst/>
+              </a:prstGeom>
+              <a:ln>
+                <a:tailEnd type="triangle"/>
+              </a:ln>
+            </p:spPr>
+            <p:style>
+              <a:lnRef idx="1">
+                <a:schemeClr val="accent1"/>
+              </a:lnRef>
+              <a:fillRef idx="0">
+                <a:schemeClr val="accent1"/>
+              </a:fillRef>
+              <a:effectRef idx="0">
+                <a:schemeClr val="accent1"/>
+              </a:effectRef>
+              <a:fontRef idx="minor">
+                <a:schemeClr val="tx1"/>
+              </a:fontRef>
+            </p:style>
+          </p:cxnSp>
+        </p:grpSp>
+        <p:cxnSp>
+          <p:nvCxnSpPr>
+            <p:cNvPr id="14" name="Straight Arrow Connector 13">
+              <a:extLst>
+                <a:ext uri="{FF2B5EF4-FFF2-40B4-BE49-F238E27FC236}">
+                  <a16:creationId xmlns:a16="http://schemas.microsoft.com/office/drawing/2014/main" id="{21C16841-494F-9F95-A72F-1126B22BDE3B}"/>
+                </a:ext>
+              </a:extLst>
+            </p:cNvPr>
+            <p:cNvCxnSpPr>
+              <a:stCxn id="3" idx="0"/>
+            </p:cNvCxnSpPr>
+            <p:nvPr/>
+          </p:nvCxnSpPr>
+          <p:spPr>
+            <a:xfrm flipH="1" flipV="1">
+              <a:off x="2929812" y="1884784"/>
+              <a:ext cx="3251719" cy="2584579"/>
+            </a:xfrm>
+            <a:prstGeom prst="straightConnector1">
+              <a:avLst/>
+            </a:prstGeom>
+            <a:ln>
+              <a:tailEnd type="triangle"/>
+            </a:ln>
+          </p:spPr>
+          <p:style>
+            <a:lnRef idx="1">
+              <a:schemeClr val="accent1"/>
+            </a:lnRef>
+            <a:fillRef idx="0">
+              <a:schemeClr val="accent1"/>
+            </a:fillRef>
+            <a:effectRef idx="0">
+              <a:schemeClr val="accent1"/>
+            </a:effectRef>
+            <a:fontRef idx="minor">
+              <a:schemeClr val="tx1"/>
+            </a:fontRef>
+          </p:style>
+        </p:cxnSp>
+        <p:cxnSp>
+          <p:nvCxnSpPr>
+            <p:cNvPr id="15" name="Straight Arrow Connector 14">
+              <a:extLst>
+                <a:ext uri="{FF2B5EF4-FFF2-40B4-BE49-F238E27FC236}">
+                  <a16:creationId xmlns:a16="http://schemas.microsoft.com/office/drawing/2014/main" id="{0F712A3C-1BEB-0C03-FB5B-B2B5645ED542}"/>
+                </a:ext>
+              </a:extLst>
+            </p:cNvPr>
+            <p:cNvCxnSpPr>
+              <a:cxnSpLocks/>
+              <a:stCxn id="3" idx="0"/>
+            </p:cNvCxnSpPr>
+            <p:nvPr/>
+          </p:nvCxnSpPr>
+          <p:spPr>
+            <a:xfrm flipV="1">
+              <a:off x="6181531" y="2174033"/>
+              <a:ext cx="3335693" cy="2295330"/>
+            </a:xfrm>
+            <a:prstGeom prst="straightConnector1">
+              <a:avLst/>
+            </a:prstGeom>
+            <a:ln>
+              <a:tailEnd type="triangle"/>
+            </a:ln>
+          </p:spPr>
+          <p:style>
+            <a:lnRef idx="1">
+              <a:schemeClr val="accent1"/>
+            </a:lnRef>
+            <a:fillRef idx="0">
+              <a:schemeClr val="accent1"/>
+            </a:fillRef>
+            <a:effectRef idx="0">
+              <a:schemeClr val="accent1"/>
+            </a:effectRef>
+            <a:fontRef idx="minor">
+              <a:schemeClr val="tx1"/>
+            </a:fontRef>
+          </p:style>
+        </p:cxnSp>
+      </p:grpSp>
+      <p:sp>
+        <p:nvSpPr>
+          <p:cNvPr id="8" name="Arrow: Right 7">
+            <a:extLst>
+              <a:ext uri="{FF2B5EF4-FFF2-40B4-BE49-F238E27FC236}">
+                <a16:creationId xmlns:a16="http://schemas.microsoft.com/office/drawing/2014/main" id="{C6A5E2E5-F09B-9123-CEE4-FA76DE0C2C52}"/>
+              </a:ext>
+            </a:extLst>
+          </p:cNvPr>
+          <p:cNvSpPr/>
+          <p:nvPr/>
+        </p:nvSpPr>
+        <p:spPr>
+          <a:xfrm rot="5023796">
+            <a:off x="4257329" y="3793481"/>
+            <a:ext cx="1980669" cy="335902"/>
+          </a:xfrm>
+          <a:prstGeom prst="rightArrow">
+            <a:avLst/>
+          </a:prstGeom>
+        </p:spPr>
+        <p:style>
+          <a:lnRef idx="1">
+            <a:schemeClr val="accent4"/>
+          </a:lnRef>
+          <a:fillRef idx="3">
+            <a:schemeClr val="accent4"/>
+          </a:fillRef>
+          <a:effectRef idx="2">
+            <a:schemeClr val="accent4"/>
+          </a:effectRef>
+          <a:fontRef idx="minor">
+            <a:schemeClr val="lt1"/>
+          </a:fontRef>
+        </p:style>
+        <p:txBody>
+          <a:bodyPr rtlCol="0" anchor="ctr"/>
+          <a:lstStyle/>
+          <a:p>
+            <a:pPr algn="ctr"/>
+            <a:endParaRPr lang="en-CA"/>
+          </a:p>
+        </p:txBody>
+      </p:sp>
+      <p:sp>
+        <p:nvSpPr>
+          <p:cNvPr id="10" name="Arrow: Right 9">
+            <a:extLst>
+              <a:ext uri="{FF2B5EF4-FFF2-40B4-BE49-F238E27FC236}">
+                <a16:creationId xmlns:a16="http://schemas.microsoft.com/office/drawing/2014/main" id="{C73CDF23-0091-2227-4B28-FDD377CFE0B6}"/>
+              </a:ext>
+            </a:extLst>
+          </p:cNvPr>
+          <p:cNvSpPr/>
+          <p:nvPr/>
+        </p:nvSpPr>
+        <p:spPr>
+          <a:xfrm rot="19875684">
+            <a:off x="5335684" y="4262076"/>
+            <a:ext cx="1980669" cy="335902"/>
+          </a:xfrm>
+          <a:prstGeom prst="rightArrow">
+            <a:avLst/>
+          </a:prstGeom>
+        </p:spPr>
+        <p:style>
+          <a:lnRef idx="1">
+            <a:schemeClr val="accent4"/>
+          </a:lnRef>
+          <a:fillRef idx="3">
+            <a:schemeClr val="accent4"/>
+          </a:fillRef>
+          <a:effectRef idx="2">
+            <a:schemeClr val="accent4"/>
+          </a:effectRef>
+          <a:fontRef idx="minor">
+            <a:schemeClr val="lt1"/>
+          </a:fontRef>
+        </p:style>
+        <p:txBody>
+          <a:bodyPr rtlCol="0" anchor="ctr"/>
+          <a:lstStyle/>
+          <a:p>
+            <a:pPr algn="ctr"/>
+            <a:endParaRPr lang="en-CA"/>
+          </a:p>
+        </p:txBody>
+      </p:sp>
+      <p:sp>
+        <p:nvSpPr>
+          <p:cNvPr id="16" name="Arrow: Right 15">
+            <a:extLst>
+              <a:ext uri="{FF2B5EF4-FFF2-40B4-BE49-F238E27FC236}">
+                <a16:creationId xmlns:a16="http://schemas.microsoft.com/office/drawing/2014/main" id="{BC3E43FE-C975-B156-B3EC-4B9D83C5BCB8}"/>
+              </a:ext>
+            </a:extLst>
+          </p:cNvPr>
+          <p:cNvSpPr/>
+          <p:nvPr/>
+        </p:nvSpPr>
+        <p:spPr>
+          <a:xfrm rot="4005870">
+            <a:off x="6479169" y="4790325"/>
+            <a:ext cx="1980669" cy="335902"/>
+          </a:xfrm>
+          <a:prstGeom prst="rightArrow">
+            <a:avLst/>
+          </a:prstGeom>
+        </p:spPr>
+        <p:style>
+          <a:lnRef idx="1">
+            <a:schemeClr val="accent4"/>
+          </a:lnRef>
+          <a:fillRef idx="3">
+            <a:schemeClr val="accent4"/>
+          </a:fillRef>
+          <a:effectRef idx="2">
+            <a:schemeClr val="accent4"/>
+          </a:effectRef>
+          <a:fontRef idx="minor">
+            <a:schemeClr val="lt1"/>
+          </a:fontRef>
+        </p:style>
+        <p:txBody>
+          <a:bodyPr rtlCol="0" anchor="ctr"/>
+          <a:lstStyle/>
+          <a:p>
+            <a:pPr algn="ctr"/>
+            <a:endParaRPr lang="en-CA"/>
+          </a:p>
+        </p:txBody>
+      </p:sp>
+      <p:sp>
+        <p:nvSpPr>
+          <p:cNvPr id="17" name="Arrow: Right 16">
+            <a:extLst>
+              <a:ext uri="{FF2B5EF4-FFF2-40B4-BE49-F238E27FC236}">
+                <a16:creationId xmlns:a16="http://schemas.microsoft.com/office/drawing/2014/main" id="{B77EB834-2A4E-B955-6342-3B510927C9A2}"/>
+              </a:ext>
+            </a:extLst>
+          </p:cNvPr>
+          <p:cNvSpPr/>
+          <p:nvPr/>
+        </p:nvSpPr>
+        <p:spPr>
+          <a:xfrm rot="19875684">
+            <a:off x="4985040" y="2256982"/>
+            <a:ext cx="1980669" cy="335902"/>
+          </a:xfrm>
+          <a:prstGeom prst="rightArrow">
+            <a:avLst/>
+          </a:prstGeom>
+        </p:spPr>
+        <p:style>
+          <a:lnRef idx="1">
+            <a:schemeClr val="accent4"/>
+          </a:lnRef>
+          <a:fillRef idx="3">
+            <a:schemeClr val="accent4"/>
+          </a:fillRef>
+          <a:effectRef idx="2">
+            <a:schemeClr val="accent4"/>
+          </a:effectRef>
+          <a:fontRef idx="minor">
+            <a:schemeClr val="lt1"/>
+          </a:fontRef>
+        </p:style>
+        <p:txBody>
+          <a:bodyPr rtlCol="0" anchor="ctr"/>
+          <a:lstStyle/>
+          <a:p>
+            <a:pPr algn="ctr"/>
+            <a:endParaRPr lang="en-CA"/>
+          </a:p>
+        </p:txBody>
+      </p:sp>
+    </p:spTree>
+    <p:extLst>
+      <p:ext uri="{BB962C8B-B14F-4D97-AF65-F5344CB8AC3E}">
+        <p14:creationId xmlns:p14="http://schemas.microsoft.com/office/powerpoint/2010/main" val="3960531629"/>
+      </p:ext>
+    </p:extLst>
+  </p:cSld>
+  <p:clrMapOvr>
+    <a:masterClrMapping/>
+  </p:clrMapOvr>
+</p:sld>
+</file>
+
+<file path=ppt/slides/slide6.xml><?xml version="1.0" encoding="utf-8"?>
+<p:sld xmlns:a="http://schemas.openxmlformats.org/drawingml/2006/main" xmlns:r="http://schemas.openxmlformats.org/officeDocument/2006/relationships" xmlns:p="http://schemas.openxmlformats.org/presentationml/2006/main">
+  <p:cSld>
+    <p:spTree>
+      <p:nvGrpSpPr>
+        <p:cNvPr id="1" name=""/>
+        <p:cNvGrpSpPr/>
+        <p:nvPr/>
+      </p:nvGrpSpPr>
+      <p:grpSpPr>
+        <a:xfrm>
+          <a:off x="0" y="0"/>
+          <a:ext cx="0" cy="0"/>
+          <a:chOff x="0" y="0"/>
+          <a:chExt cx="0" cy="0"/>
+        </a:xfrm>
+      </p:grpSpPr>
+      <p:grpSp>
+        <p:nvGrpSpPr>
+          <p:cNvPr id="12" name="Group 11">
+            <a:extLst>
+              <a:ext uri="{FF2B5EF4-FFF2-40B4-BE49-F238E27FC236}">
+                <a16:creationId xmlns:a16="http://schemas.microsoft.com/office/drawing/2014/main" id="{475C41AE-9704-3B51-0D67-55D3F1BA8FB3}"/>
+              </a:ext>
+            </a:extLst>
+          </p:cNvPr>
+          <p:cNvGrpSpPr/>
+          <p:nvPr/>
+        </p:nvGrpSpPr>
+        <p:grpSpPr>
+          <a:xfrm>
+            <a:off x="3803787" y="2327988"/>
+            <a:ext cx="1866122" cy="1866122"/>
+            <a:chOff x="5411755" y="270588"/>
+            <a:chExt cx="1866122" cy="1866122"/>
+          </a:xfrm>
+        </p:grpSpPr>
+        <p:sp>
+          <p:nvSpPr>
+            <p:cNvPr id="2" name="Oval 1">
+              <a:extLst>
+                <a:ext uri="{FF2B5EF4-FFF2-40B4-BE49-F238E27FC236}">
+                  <a16:creationId xmlns:a16="http://schemas.microsoft.com/office/drawing/2014/main" id="{DE784E79-97CD-5541-FE30-0EFAFDBF7A96}"/>
+                </a:ext>
+              </a:extLst>
+            </p:cNvPr>
+            <p:cNvSpPr/>
+            <p:nvPr/>
+          </p:nvSpPr>
+          <p:spPr>
+            <a:xfrm>
+              <a:off x="5411755" y="270588"/>
+              <a:ext cx="1866122" cy="1866122"/>
+            </a:xfrm>
+            <a:prstGeom prst="ellipse">
+              <a:avLst/>
+            </a:prstGeom>
+          </p:spPr>
+          <p:style>
+            <a:lnRef idx="2">
+              <a:schemeClr val="accent1">
+                <a:shade val="15000"/>
+              </a:schemeClr>
+            </a:lnRef>
+            <a:fillRef idx="1">
+              <a:schemeClr val="accent1"/>
+            </a:fillRef>
+            <a:effectRef idx="0">
+              <a:schemeClr val="accent1"/>
+            </a:effectRef>
+            <a:fontRef idx="minor">
+              <a:schemeClr val="lt1"/>
+            </a:fontRef>
+          </p:style>
+          <p:txBody>
+            <a:bodyPr rtlCol="0" anchor="ctr"/>
+            <a:lstStyle/>
+            <a:p>
+              <a:pPr algn="ctr"/>
+              <a:endParaRPr lang="en-CA"/>
+            </a:p>
+          </p:txBody>
+        </p:sp>
+        <p:sp>
+          <p:nvSpPr>
+            <p:cNvPr id="4" name="Oval 3">
+              <a:extLst>
+                <a:ext uri="{FF2B5EF4-FFF2-40B4-BE49-F238E27FC236}">
+                  <a16:creationId xmlns:a16="http://schemas.microsoft.com/office/drawing/2014/main" id="{31978DBD-65A7-1943-216C-5EE14F1429CB}"/>
+                </a:ext>
+              </a:extLst>
+            </p:cNvPr>
+            <p:cNvSpPr/>
+            <p:nvPr/>
+          </p:nvSpPr>
+          <p:spPr>
+            <a:xfrm>
+              <a:off x="6218853" y="1077686"/>
+              <a:ext cx="251926" cy="251926"/>
+            </a:xfrm>
+            <a:prstGeom prst="ellipse">
+              <a:avLst/>
+            </a:prstGeom>
+          </p:spPr>
+          <p:style>
+            <a:lnRef idx="2">
+              <a:schemeClr val="accent6">
+                <a:shade val="15000"/>
+              </a:schemeClr>
+            </a:lnRef>
+            <a:fillRef idx="1">
+              <a:schemeClr val="accent6"/>
+            </a:fillRef>
+            <a:effectRef idx="0">
+              <a:schemeClr val="accent6"/>
+            </a:effectRef>
+            <a:fontRef idx="minor">
+              <a:schemeClr val="lt1"/>
+            </a:fontRef>
+          </p:style>
+          <p:txBody>
+            <a:bodyPr rtlCol="0" anchor="ctr"/>
+            <a:lstStyle/>
+            <a:p>
+              <a:pPr algn="ctr"/>
+              <a:endParaRPr lang="en-CA"/>
+            </a:p>
+          </p:txBody>
+        </p:sp>
+      </p:grpSp>
+      <p:sp>
+        <p:nvSpPr>
+          <p:cNvPr id="3" name="Rectangle 2">
+            <a:extLst>
+              <a:ext uri="{FF2B5EF4-FFF2-40B4-BE49-F238E27FC236}">
+                <a16:creationId xmlns:a16="http://schemas.microsoft.com/office/drawing/2014/main" id="{5F9CDCFC-CD9A-334D-90BD-CBCA001B7BB5}"/>
+              </a:ext>
+            </a:extLst>
+          </p:cNvPr>
+          <p:cNvSpPr/>
+          <p:nvPr/>
+        </p:nvSpPr>
+        <p:spPr>
+          <a:xfrm rot="3519487">
+            <a:off x="1387" y="2091918"/>
+            <a:ext cx="5477422" cy="275625"/>
+          </a:xfrm>
+          <a:prstGeom prst="rect">
+            <a:avLst/>
+          </a:prstGeom>
+        </p:spPr>
+        <p:style>
+          <a:lnRef idx="2">
+            <a:schemeClr val="accent1">
+              <a:shade val="15000"/>
+            </a:schemeClr>
+          </a:lnRef>
+          <a:fillRef idx="1">
+            <a:schemeClr val="accent1"/>
+          </a:fillRef>
+          <a:effectRef idx="0">
+            <a:schemeClr val="accent1"/>
+          </a:effectRef>
+          <a:fontRef idx="minor">
+            <a:schemeClr val="lt1"/>
+          </a:fontRef>
+        </p:style>
+        <p:txBody>
+          <a:bodyPr rtlCol="0" anchor="ctr"/>
+          <a:lstStyle/>
+          <a:p>
+            <a:pPr algn="ctr"/>
+            <a:endParaRPr lang="en-CA"/>
+          </a:p>
+        </p:txBody>
+      </p:sp>
+      <p:sp>
+        <p:nvSpPr>
+          <p:cNvPr id="5" name="Rectangle 4">
+            <a:extLst>
+              <a:ext uri="{FF2B5EF4-FFF2-40B4-BE49-F238E27FC236}">
+                <a16:creationId xmlns:a16="http://schemas.microsoft.com/office/drawing/2014/main" id="{C1DB7CC4-6579-9F0B-2A5A-9F94DB4ACC39}"/>
+              </a:ext>
+            </a:extLst>
+          </p:cNvPr>
+          <p:cNvSpPr/>
+          <p:nvPr/>
+        </p:nvSpPr>
+        <p:spPr>
+          <a:xfrm rot="20668720">
+            <a:off x="4037480" y="3743440"/>
+            <a:ext cx="5477422" cy="275625"/>
+          </a:xfrm>
+          <a:prstGeom prst="rect">
+            <a:avLst/>
+          </a:prstGeom>
+        </p:spPr>
+        <p:style>
+          <a:lnRef idx="2">
+            <a:schemeClr val="accent1">
+              <a:shade val="15000"/>
+            </a:schemeClr>
+          </a:lnRef>
+          <a:fillRef idx="1">
+            <a:schemeClr val="accent1"/>
+          </a:fillRef>
+          <a:effectRef idx="0">
+            <a:schemeClr val="accent1"/>
+          </a:effectRef>
+          <a:fontRef idx="minor">
+            <a:schemeClr val="lt1"/>
+          </a:fontRef>
+        </p:style>
+        <p:txBody>
+          <a:bodyPr rtlCol="0" anchor="ctr"/>
+          <a:lstStyle/>
+          <a:p>
+            <a:pPr algn="ctr"/>
+            <a:endParaRPr lang="en-CA"/>
+          </a:p>
+        </p:txBody>
+      </p:sp>
+    </p:spTree>
+    <p:extLst>
+      <p:ext uri="{BB962C8B-B14F-4D97-AF65-F5344CB8AC3E}">
+        <p14:creationId xmlns:p14="http://schemas.microsoft.com/office/powerpoint/2010/main" val="557578118"/>
+      </p:ext>
+    </p:extLst>
+  </p:cSld>
+  <p:clrMapOvr>
+    <a:masterClrMapping/>
+  </p:clrMapOvr>
+</p:sld>
+</file>
+
 <file path=ppt/theme/theme1.xml><?xml version="1.0" encoding="utf-8"?>
 <a:theme xmlns:a="http://schemas.openxmlformats.org/drawingml/2006/main" name="Office Theme">
   <a:themeElements>

</xml_diff>